<commit_message>
Edit template for slides with tasks and speaker notes
</commit_message>
<xml_diff>
--- a/_site/materials/module-3/M3-S6-GitHub/M3-S6-GitHub-slides.pptx
+++ b/_site/materials/module-3/M3-S6-GitHub/M3-S6-GitHub-slides.pptx
@@ -5,7 +5,7 @@
     <p:sldMasterId id="2147483648" r:id="rId1"/>
   </p:sldMasterIdLst>
   <p:notesMasterIdLst>
-    <p:notesMasterId r:id="rId49"/>
+    <p:notesMasterId r:id="rId50"/>
   </p:notesMasterIdLst>
   <p:sldIdLst>
     <p:sldId id="256" r:id="rId2"/>
@@ -55,6 +55,7 @@
     <p:sldId id="300" r:id="rId46"/>
     <p:sldId id="301" r:id="rId47"/>
     <p:sldId id="302" r:id="rId48"/>
+    <p:sldId id="303" r:id="rId49"/>
   </p:sldIdLst>
   <p:sldSz cx="9144000" cy="5143500" type="screen16x9"/>
   <p:notesSz cx="6858000" cy="9144000"/>
@@ -570,7 +571,37 @@
             </a:pPr>
             <a:r>
               <a:rPr/>
-              <a:t>Make it clear to the group that there will be a similar post-submodule survey to examine understanding and learning progress.</a:t>
+              <a:t>These are the </a:t>
+            </a:r>
+            <a:r>
+              <a:rPr b="1"/>
+              <a:t>speaker notes</a:t>
+            </a:r>
+            <a:r>
+              <a:rPr/>
+              <a:t>. You will a script for the presenter for every slide. In presentation mode, your audience will not be able to see these speaker notes, they are only visible to the presenter.</a:t>
+            </a:r>
+          </a:p>
+          <a:p>
+            <a:pPr lvl="0" indent="0" marL="0">
+              <a:buNone/>
+            </a:pPr>
+          </a:p>
+          <a:p>
+            <a:pPr lvl="0" indent="0" marL="0">
+              <a:buNone/>
+            </a:pPr>
+            <a:r>
+              <a:rPr/>
+              <a:t>There are also </a:t>
+            </a:r>
+            <a:r>
+              <a:rPr b="1"/>
+              <a:t>instructor notes</a:t>
+            </a:r>
+            <a:r>
+              <a:rPr/>
+              <a:t>. For some slides, there will be pedagogical tips, suggestons for acitivities and troubleshooting tips for issues your audience might run into. You can find these notes underneath the speaker notes.</a:t>
             </a:r>
           </a:p>
         </p:txBody>
@@ -592,7 +623,7 @@
           <a:p>
             <a:fld id="{18BDFEC3-8487-43E8-A154-7C12CBC1FFF2}" type="slidenum">
               <a:rPr lang="en-US"/>
-              <a:t>9</a:t>
+              <a:t>3</a:t>
             </a:fld>
             <a:endParaRPr lang="en-US"/>
           </a:p>
@@ -652,7 +683,7 @@
             </a:pPr>
             <a:r>
               <a:rPr/>
-              <a:t>Base yourself on conceptual change theory and examine exisiting concepts in relation to some key terms. Re-examine formation of new concepts at the end of the lesson.</a:t>
+              <a:t>Make it clear to the group that there will be a similar post-submodule survey to examine understanding and learning progress.</a:t>
             </a:r>
           </a:p>
         </p:txBody>
@@ -674,7 +705,7 @@
           <a:p>
             <a:fld id="{18BDFEC3-8487-43E8-A154-7C12CBC1FFF2}" type="slidenum">
               <a:rPr lang="en-US"/>
-              <a:t>12</a:t>
+              <a:t>9</a:t>
             </a:fld>
             <a:endParaRPr lang="en-US"/>
           </a:p>
@@ -734,7 +765,7 @@
             </a:pPr>
             <a:r>
               <a:rPr/>
-              <a:t>For a 90-minute lesson, the instructor should try to “lecture” for only 20 minutes, students should work in groups/pairs/on their own for at least 55 minutes of the lesson (+ a 15 minute break).</a:t>
+              <a:t>Base yourself on conceptual change theory and examine exisiting concepts in relation to some key terms. Re-examine formation of new concepts at the end of the lesson.</a:t>
             </a:r>
           </a:p>
         </p:txBody>
@@ -816,7 +847,7 @@
             </a:pPr>
             <a:r>
               <a:rPr/>
-              <a:t>For students who advance faster: Prepare extra exercises.</a:t>
+              <a:t>For a 90-minute lesson, the instructor should try to “lecture” for only 20 minutes, students should work in groups/pairs/on their own for at least 55 minutes of the lesson (+ a 15 minute break).</a:t>
             </a:r>
           </a:p>
         </p:txBody>
@@ -838,7 +869,89 @@
           <a:p>
             <a:fld id="{18BDFEC3-8487-43E8-A154-7C12CBC1FFF2}" type="slidenum">
               <a:rPr lang="en-US"/>
-              <a:t>19</a:t>
+              <a:t>14</a:t>
+            </a:fld>
+            <a:endParaRPr lang="en-US"/>
+          </a:p>
+        </p:txBody>
+      </p:sp>
+    </p:spTree>
+  </p:cSld>
+</p:notes>
+</file>
+
+<file path=ppt/notesSlides/notesSlide5.xml><?xml version="1.0" encoding="utf-8"?>
+<p:notes xmlns:a="http://schemas.openxmlformats.org/drawingml/2006/main" xmlns:r="http://schemas.openxmlformats.org/officeDocument/2006/relationships" xmlns:p="http://schemas.openxmlformats.org/presentationml/2006/main">
+  <p:cSld>
+    <p:spTree>
+      <p:nvGrpSpPr>
+        <p:cNvPr id="1" name=""/>
+        <p:cNvGrpSpPr/>
+        <p:nvPr/>
+      </p:nvGrpSpPr>
+      <p:grpSpPr>
+        <a:xfrm>
+          <a:off x="0" y="0"/>
+          <a:ext cx="0" cy="0"/>
+          <a:chOff x="0" y="0"/>
+          <a:chExt cx="0" cy="0"/>
+        </a:xfrm>
+      </p:grpSpPr>
+      <p:sp>
+        <p:nvSpPr>
+          <p:cNvPr id="2" name="Slide Image Placeholder 1"/>
+          <p:cNvSpPr>
+            <a:spLocks noGrp="1" noRot="1" noChangeAspect="1"/>
+          </p:cNvSpPr>
+          <p:nvPr>
+            <p:ph type="sldImg"/>
+          </p:nvPr>
+        </p:nvSpPr>
+        <p:spPr/>
+      </p:sp>
+      <p:sp>
+        <p:nvSpPr>
+          <p:cNvPr id="3" name="Notes Placeholder 2"/>
+          <p:cNvSpPr>
+            <a:spLocks noGrp="1"/>
+          </p:cNvSpPr>
+          <p:nvPr>
+            <p:ph type="body" idx="1"/>
+          </p:nvPr>
+        </p:nvSpPr>
+        <p:spPr/>
+        <p:txBody>
+          <a:bodyPr/>
+          <a:lstStyle/>
+          <a:p>
+            <a:pPr lvl="0" indent="0" marL="0">
+              <a:buNone/>
+            </a:pPr>
+            <a:r>
+              <a:rPr/>
+              <a:t>For students who advance faster: Prepare extra exercises.</a:t>
+            </a:r>
+          </a:p>
+        </p:txBody>
+      </p:sp>
+      <p:sp>
+        <p:nvSpPr>
+          <p:cNvPr id="4" name="Slide Number Placeholder 3"/>
+          <p:cNvSpPr>
+            <a:spLocks noGrp="1"/>
+          </p:cNvSpPr>
+          <p:nvPr>
+            <p:ph type="sldNum" sz="quarter" idx="10"/>
+          </p:nvPr>
+        </p:nvSpPr>
+        <p:spPr/>
+        <p:txBody>
+          <a:bodyPr/>
+          <a:lstStyle/>
+          <a:p>
+            <a:fld id="{18BDFEC3-8487-43E8-A154-7C12CBC1FFF2}" type="slidenum">
+              <a:rPr lang="en-US"/>
+              <a:t>20</a:t>
             </a:fld>
             <a:endParaRPr lang="en-US"/>
           </a:p>
@@ -3841,7 +3954,7 @@
             </a:pPr>
             <a:r>
               <a:rPr/>
-              <a:t>Preregistration</a:t>
+              <a:t>Template Slides: Title of Submodule</a:t>
             </a:r>
           </a:p>
         </p:txBody>
@@ -4129,7 +4242,7 @@
             </a:pPr>
             <a:r>
               <a:rPr b="1"/>
-              <a:t>Key terms and definitions</a:t>
+              <a:t>Covered in in this session</a:t>
             </a:r>
           </a:p>
           <a:p>
@@ -4140,40 +4253,28 @@
             </a:r>
             <a:r>
               <a:rPr/>
-              <a:t>: Introduce key terms and definitions that students will come across throughout the session. </a:t>
-            </a:r>
-          </a:p>
-          <a:p>
-            <a:pPr lvl="0"/>
-            <a:r>
-              <a:rPr b="1"/>
-              <a:t>Key Term 1</a:t>
-            </a:r>
-            <a:r>
-              <a:rPr/>
-              <a:t>: Definition</a:t>
-            </a:r>
-          </a:p>
-          <a:p>
-            <a:pPr lvl="0"/>
-            <a:r>
-              <a:rPr b="1"/>
-              <a:t>Key Term 2</a:t>
-            </a:r>
-            <a:r>
-              <a:rPr/>
-              <a:t>: Definition</a:t>
-            </a:r>
-          </a:p>
-          <a:p>
-            <a:pPr lvl="0"/>
-            <a:r>
-              <a:rPr b="1"/>
-              <a:t>Key Term 3</a:t>
-            </a:r>
-            <a:r>
-              <a:rPr/>
-              <a:t>: Definition</a:t>
+              <a:t>: This slides serves as an overview of the topics that are discussed, presented as bullet point:</a:t>
+            </a:r>
+          </a:p>
+          <a:p>
+            <a:pPr lvl="0"/>
+            <a:r>
+              <a:rPr/>
+              <a:t>Topic 1</a:t>
+            </a:r>
+          </a:p>
+          <a:p>
+            <a:pPr lvl="0"/>
+            <a:r>
+              <a:rPr/>
+              <a:t>Topic 2</a:t>
+            </a:r>
+          </a:p>
+          <a:p>
+            <a:pPr lvl="0"/>
+            <a:r>
+              <a:rPr/>
+              <a:t>Topic 3</a:t>
             </a:r>
           </a:p>
         </p:txBody>
@@ -4223,7 +4324,7 @@
             </a:pPr>
             <a:r>
               <a:rPr b="1"/>
-              <a:t>Introduction of submodule topic</a:t>
+              <a:t>Key terms and definitions</a:t>
             </a:r>
           </a:p>
           <a:p>
@@ -4234,21 +4335,40 @@
             </a:r>
             <a:r>
               <a:rPr/>
-              <a:t>: Core theoretical introduction of submodule topic.</a:t>
-            </a:r>
-          </a:p>
-          <a:p>
-            <a:pPr lvl="0"/>
-            <a:r>
-              <a:rPr/>
-              <a:t>Pair theoretical aspects with practical exercises and group discussions according to the Think-Pair-Share style and according to Cognitive Load Theory (Sweller, 1980).</a:t>
-            </a:r>
-          </a:p>
-          <a:p>
-            <a:pPr lvl="0"/>
-            <a:r>
-              <a:rPr/>
-              <a:t>Use multiple slides for this part.</a:t>
+              <a:t>: Introduce key terms and definitions that students will come across throughout the session. </a:t>
+            </a:r>
+          </a:p>
+          <a:p>
+            <a:pPr lvl="0"/>
+            <a:r>
+              <a:rPr b="1"/>
+              <a:t>Key Term 1</a:t>
+            </a:r>
+            <a:r>
+              <a:rPr/>
+              <a:t>: Definition</a:t>
+            </a:r>
+          </a:p>
+          <a:p>
+            <a:pPr lvl="0"/>
+            <a:r>
+              <a:rPr b="1"/>
+              <a:t>Key Term 2</a:t>
+            </a:r>
+            <a:r>
+              <a:rPr/>
+              <a:t>: Definition</a:t>
+            </a:r>
+          </a:p>
+          <a:p>
+            <a:pPr lvl="0"/>
+            <a:r>
+              <a:rPr b="1"/>
+              <a:t>Key Term 3</a:t>
+            </a:r>
+            <a:r>
+              <a:rPr/>
+              <a:t>: Definition</a:t>
             </a:r>
           </a:p>
         </p:txBody>
@@ -4298,7 +4418,7 @@
             </a:pPr>
             <a:r>
               <a:rPr b="1"/>
-              <a:t>Submodule content slide</a:t>
+              <a:t>Introduction of submodule topic</a:t>
             </a:r>
           </a:p>
           <a:p>
@@ -4309,50 +4429,21 @@
             </a:r>
             <a:r>
               <a:rPr/>
-              <a:t>: Present relevant content</a:t>
-            </a:r>
-          </a:p>
-          <a:p>
-            <a:pPr lvl="0"/>
-            <a:r>
-              <a:rPr/>
-              <a:t>Highlight particularly important aspects with Quarto call-out boxes, for example:</a:t>
-            </a:r>
-          </a:p>
-          <a:p>
-            <a:pPr lvl="0" indent="0" marL="1270000">
-              <a:buNone/>
-            </a:pPr>
-            <a:r>
-              <a:rPr sz="2000" b="1"/>
-              <a:t>Important with Title</a:t>
-            </a:r>
-          </a:p>
-          <a:p>
-            <a:pPr lvl="0" indent="0" marL="1270000">
-              <a:buNone/>
-            </a:pPr>
-            <a:r>
-              <a:rPr sz="2000"/>
-              <a:t>This is an example of a callout box to highlight particularly important information.</a:t>
-            </a:r>
-          </a:p>
-          <a:p>
-            <a:pPr lvl="0" indent="0" marL="1270000">
-              <a:buNone/>
-            </a:pPr>
-            <a:r>
-              <a:rPr sz="2000" b="1"/>
-              <a:t>Tip with Title</a:t>
-            </a:r>
-          </a:p>
-          <a:p>
-            <a:pPr lvl="0" indent="0" marL="1270000">
-              <a:buNone/>
-            </a:pPr>
-            <a:r>
-              <a:rPr sz="2000"/>
-              <a:t>This is an example of a callout box to give important tips.</a:t>
+              <a:t>: Core theoretical introduction of submodule topic.</a:t>
+            </a:r>
+          </a:p>
+          <a:p>
+            <a:pPr lvl="0"/>
+            <a:r>
+              <a:rPr/>
+              <a:t>Pair theoretical aspects with practical exercises and group discussions according to the Think-Pair-Share style and according to Cognitive Load Theory (Sweller, 1980).</a:t>
+            </a:r>
+          </a:p>
+          <a:p>
+            <a:pPr lvl="0"/>
+            <a:r>
+              <a:rPr/>
+              <a:t>Use multiple slides for this part.</a:t>
             </a:r>
           </a:p>
         </p:txBody>
@@ -4402,7 +4493,7 @@
             </a:pPr>
             <a:r>
               <a:rPr b="1"/>
-              <a:t>Pre-break survey</a:t>
+              <a:t>Submodule content slide</a:t>
             </a:r>
           </a:p>
           <a:p>
@@ -4413,68 +4504,50 @@
             </a:r>
             <a:r>
               <a:rPr/>
-              <a:t>: This pre-break survey serves to examine students’ current understanding of key concepts of the submodule</a:t>
-            </a:r>
-          </a:p>
-          <a:p>
-            <a:pPr lvl="0" indent="0" marL="0">
-              <a:spcBef>
-                <a:spcPts val="3000"/>
-              </a:spcBef>
-              <a:buNone/>
-            </a:pPr>
-            <a:r>
-              <a:rPr b="1"/>
-              <a:t>Use free survey software such as or other survey software (particify, formR) to establish the following questions (shown on separate slides):</a:t>
-            </a:r>
-          </a:p>
-          <a:p>
-            <a:pPr lvl="0" indent="0" marL="0">
-              <a:buNone/>
-            </a:pPr>
-            <a:r>
-              <a:rPr b="1"/>
-              <a:t>Which species is the largest type of penguin</a:t>
-            </a:r>
-            <a:r>
-              <a:rPr/>
-              <a:t>?</a:t>
-            </a:r>
-          </a:p>
-          <a:p>
-            <a:pPr lvl="0" indent="-342900" marL="342900">
-              <a:buAutoNum type="alphaLcPeriod"/>
-            </a:pPr>
-            <a:r>
-              <a:rPr/>
-              <a:t>Chinstrap Penguin</a:t>
-            </a:r>
-          </a:p>
-          <a:p>
-            <a:pPr lvl="0" indent="-342900" marL="342900">
-              <a:buAutoNum type="alphaLcPeriod"/>
-            </a:pPr>
-            <a:r>
-              <a:rPr/>
-              <a:t>Emperor Penguin ✅</a:t>
-            </a:r>
-          </a:p>
-          <a:p>
-            <a:pPr lvl="0" indent="-342900" marL="342900">
-              <a:buAutoNum type="alphaLcPeriod"/>
-            </a:pPr>
-            <a:r>
-              <a:rPr/>
-              <a:t>Adélie Penguin</a:t>
-            </a:r>
-          </a:p>
-          <a:p>
-            <a:pPr lvl="0" indent="-342900" marL="342900">
-              <a:buAutoNum type="alphaLcPeriod"/>
-            </a:pPr>
-            <a:r>
-              <a:rPr/>
-              <a:t>King Penguin</a:t>
+              <a:t>: Present relevant content</a:t>
+            </a:r>
+          </a:p>
+          <a:p>
+            <a:pPr lvl="0"/>
+            <a:r>
+              <a:rPr/>
+              <a:t>Highlight particularly important aspects with Quarto call-out boxes, for example:</a:t>
+            </a:r>
+          </a:p>
+          <a:p>
+            <a:pPr lvl="0" indent="0" marL="1270000">
+              <a:buNone/>
+            </a:pPr>
+            <a:r>
+              <a:rPr sz="2000" b="1"/>
+              <a:t>Important with Title</a:t>
+            </a:r>
+          </a:p>
+          <a:p>
+            <a:pPr lvl="0" indent="0" marL="1270000">
+              <a:buNone/>
+            </a:pPr>
+            <a:r>
+              <a:rPr sz="2000"/>
+              <a:t>This is an example of a callout box to highlight particularly important information.</a:t>
+            </a:r>
+          </a:p>
+          <a:p>
+            <a:pPr lvl="0" indent="0" marL="1270000">
+              <a:buNone/>
+            </a:pPr>
+            <a:r>
+              <a:rPr sz="2000" b="1"/>
+              <a:t>Tip with Title</a:t>
+            </a:r>
+          </a:p>
+          <a:p>
+            <a:pPr lvl="0" indent="0" marL="1270000">
+              <a:buNone/>
+            </a:pPr>
+            <a:r>
+              <a:rPr sz="2000"/>
+              <a:t>This is an example of a callout box to give important tips.</a:t>
             </a:r>
           </a:p>
         </p:txBody>
@@ -4517,11 +4590,50 @@
           <a:lstStyle/>
           <a:p>
             <a:pPr lvl="0" indent="0" marL="0">
-              <a:buNone/>
-            </a:pPr>
-            <a:r>
-              <a:rPr b="1"/>
-              <a:t>What is the key biological feature that helps penguins swim efficiently?</a:t>
+              <a:spcBef>
+                <a:spcPts val="3000"/>
+              </a:spcBef>
+              <a:buNone/>
+            </a:pPr>
+            <a:r>
+              <a:rPr b="1"/>
+              <a:t>Pre-break survey</a:t>
+            </a:r>
+          </a:p>
+          <a:p>
+            <a:pPr lvl="0"/>
+            <a:r>
+              <a:rPr b="1"/>
+              <a:t>Aim</a:t>
+            </a:r>
+            <a:r>
+              <a:rPr/>
+              <a:t>: This pre-break survey serves to examine students’ current understanding of key concepts of the submodule</a:t>
+            </a:r>
+          </a:p>
+          <a:p>
+            <a:pPr lvl="0" indent="0" marL="0">
+              <a:spcBef>
+                <a:spcPts val="3000"/>
+              </a:spcBef>
+              <a:buNone/>
+            </a:pPr>
+            <a:r>
+              <a:rPr b="1"/>
+              <a:t>Use free survey software such as or other survey software (particify, formR) to establish the following questions (shown on separate slides):</a:t>
+            </a:r>
+          </a:p>
+          <a:p>
+            <a:pPr lvl="0" indent="0" marL="0">
+              <a:buNone/>
+            </a:pPr>
+            <a:r>
+              <a:rPr b="1"/>
+              <a:t>Which species is the largest type of penguin</a:t>
+            </a:r>
+            <a:r>
+              <a:rPr/>
+              <a:t>?</a:t>
             </a:r>
           </a:p>
           <a:p>
@@ -4530,7 +4642,7 @@
             </a:pPr>
             <a:r>
               <a:rPr/>
-              <a:t>Hollow bones for buoyancy</a:t>
+              <a:t>Chinstrap Penguin</a:t>
             </a:r>
           </a:p>
           <a:p>
@@ -4539,7 +4651,7 @@
             </a:pPr>
             <a:r>
               <a:rPr/>
-              <a:t>Webbed feet for paddling</a:t>
+              <a:t>Emperor Penguin ✅</a:t>
             </a:r>
           </a:p>
           <a:p>
@@ -4548,7 +4660,7 @@
             </a:pPr>
             <a:r>
               <a:rPr/>
-              <a:t>Waterproof feathers and flipper-like wings ✅</a:t>
+              <a:t>Adélie Penguin</a:t>
             </a:r>
           </a:p>
           <a:p>
@@ -4557,7 +4669,7 @@
             </a:pPr>
             <a:r>
               <a:rPr/>
-              <a:t>Gills to breathe underwater</a:t>
+              <a:t>King Penguin</a:t>
             </a:r>
           </a:p>
         </p:txBody>
@@ -4586,12 +4698,12 @@
       </p:grpSpPr>
       <p:sp>
         <p:nvSpPr>
-          <p:cNvPr id="2" name="Title 1"/>
-          <p:cNvSpPr>
-            <a:spLocks noGrp="1"/>
-          </p:cNvSpPr>
-          <p:nvPr>
-            <p:ph type="title"/>
+          <p:cNvPr id="3" name="Content Placeholder 2"/>
+          <p:cNvSpPr>
+            <a:spLocks noGrp="1"/>
+          </p:cNvSpPr>
+          <p:nvPr>
+            <p:ph idx="1"/>
           </p:nvPr>
         </p:nvSpPr>
         <p:spPr/>
@@ -4603,8 +4715,44 @@
               <a:buNone/>
             </a:pPr>
             <a:r>
-              <a:rPr/>
-              <a:t>Break! 15 minutes</a:t>
+              <a:rPr b="1"/>
+              <a:t>What is the key biological feature that helps penguins swim efficiently?</a:t>
+            </a:r>
+          </a:p>
+          <a:p>
+            <a:pPr lvl="0" indent="-342900" marL="342900">
+              <a:buAutoNum type="alphaLcPeriod"/>
+            </a:pPr>
+            <a:r>
+              <a:rPr/>
+              <a:t>Hollow bones for buoyancy</a:t>
+            </a:r>
+          </a:p>
+          <a:p>
+            <a:pPr lvl="0" indent="-342900" marL="342900">
+              <a:buAutoNum type="alphaLcPeriod"/>
+            </a:pPr>
+            <a:r>
+              <a:rPr/>
+              <a:t>Webbed feet for paddling</a:t>
+            </a:r>
+          </a:p>
+          <a:p>
+            <a:pPr lvl="0" indent="-342900" marL="342900">
+              <a:buAutoNum type="alphaLcPeriod"/>
+            </a:pPr>
+            <a:r>
+              <a:rPr/>
+              <a:t>Waterproof feathers and flipper-like wings ✅</a:t>
+            </a:r>
+          </a:p>
+          <a:p>
+            <a:pPr lvl="0" indent="-342900" marL="342900">
+              <a:buAutoNum type="alphaLcPeriod"/>
+            </a:pPr>
+            <a:r>
+              <a:rPr/>
+              <a:t>Gills to breathe underwater</a:t>
             </a:r>
           </a:p>
         </p:txBody>
@@ -4633,12 +4781,12 @@
       </p:grpSpPr>
       <p:sp>
         <p:nvSpPr>
-          <p:cNvPr id="3" name="Content Placeholder 2"/>
-          <p:cNvSpPr>
-            <a:spLocks noGrp="1"/>
-          </p:cNvSpPr>
-          <p:nvPr>
-            <p:ph idx="1"/>
+          <p:cNvPr id="2" name="Title 1"/>
+          <p:cNvSpPr>
+            <a:spLocks noGrp="1"/>
+          </p:cNvSpPr>
+          <p:nvPr>
+            <p:ph type="title"/>
           </p:nvPr>
         </p:nvSpPr>
         <p:spPr/>
@@ -4647,32 +4795,11 @@
           <a:lstStyle/>
           <a:p>
             <a:pPr lvl="0" indent="0" marL="0">
-              <a:spcBef>
-                <a:spcPts val="3000"/>
-              </a:spcBef>
-              <a:buNone/>
-            </a:pPr>
-            <a:r>
-              <a:rPr b="1"/>
-              <a:t>Post-break survey discussion</a:t>
-            </a:r>
-          </a:p>
-          <a:p>
-            <a:pPr lvl="0"/>
-            <a:r>
-              <a:rPr b="1"/>
-              <a:t>Aim</a:t>
-            </a:r>
-            <a:r>
-              <a:rPr/>
-              <a:t>: To clarify concepts and aspects that are not yet understood</a:t>
-            </a:r>
-          </a:p>
-          <a:p>
-            <a:pPr lvl="0"/>
-            <a:r>
-              <a:rPr/>
-              <a:t>Highlight specific answers given during the survey</a:t>
+              <a:buNone/>
+            </a:pPr>
+            <a:r>
+              <a:rPr/>
+              <a:t>Break! 15 minutes</a:t>
             </a:r>
           </a:p>
         </p:txBody>
@@ -4722,7 +4849,7 @@
             </a:pPr>
             <a:r>
               <a:rPr b="1"/>
-              <a:t>Practical exercises on topic</a:t>
+              <a:t>Post-break survey discussion</a:t>
             </a:r>
           </a:p>
           <a:p>
@@ -4733,14 +4860,14 @@
             </a:r>
             <a:r>
               <a:rPr/>
-              <a:t>: Design practical exercises for students to apply the new skills in practise.</a:t>
-            </a:r>
-          </a:p>
-          <a:p>
-            <a:pPr lvl="0"/>
-            <a:r>
-              <a:rPr/>
-              <a:t>Depending on the topic, the exercises should be in accordance with the learning objective(s).</a:t>
+              <a:t>: To clarify concepts and aspects that are not yet understood</a:t>
+            </a:r>
+          </a:p>
+          <a:p>
+            <a:pPr lvl="0"/>
+            <a:r>
+              <a:rPr/>
+              <a:t>Highlight specific answers given during the survey</a:t>
             </a:r>
           </a:p>
         </p:txBody>
@@ -5003,7 +5130,7 @@
             </a:pPr>
             <a:r>
               <a:rPr b="1"/>
-              <a:t>Relevance and implications</a:t>
+              <a:t>Practical exercises on topic</a:t>
             </a:r>
           </a:p>
           <a:p>
@@ -5014,21 +5141,14 @@
             </a:r>
             <a:r>
               <a:rPr/>
-              <a:t>: To work out the relevance of the topic to your students.</a:t>
-            </a:r>
-          </a:p>
-          <a:p>
-            <a:pPr lvl="0"/>
-            <a:r>
-              <a:rPr/>
-              <a:t>In an interactive setting, discuss how the new skills could be applied in practise with specific examples.</a:t>
-            </a:r>
-          </a:p>
-          <a:p>
-            <a:pPr lvl="0"/>
-            <a:r>
-              <a:rPr/>
-              <a:t>Examine downfalls and practical obstacles.</a:t>
+              <a:t>: Design practical exercises for students to apply the new skills in practise.</a:t>
+            </a:r>
+          </a:p>
+          <a:p>
+            <a:pPr lvl="0"/>
+            <a:r>
+              <a:rPr/>
+              <a:t>Depending on the topic, the exercises should be in accordance with the learning objective(s).</a:t>
             </a:r>
           </a:p>
         </p:txBody>
@@ -5078,38 +5198,32 @@
             </a:pPr>
             <a:r>
               <a:rPr b="1"/>
-              <a:t>Take-home message</a:t>
-            </a:r>
-          </a:p>
-          <a:p>
-            <a:pPr lvl="0" indent="0" marL="0">
-              <a:buNone/>
-            </a:pPr>
+              <a:t>Relevance and implications</a:t>
+            </a:r>
+          </a:p>
+          <a:p>
+            <a:pPr lvl="0"/>
             <a:r>
               <a:rPr b="1"/>
               <a:t>Aim</a:t>
             </a:r>
             <a:r>
               <a:rPr/>
-              <a:t>: End lesson on clear take-home message that are interactively compiled by students.</a:t>
-            </a:r>
-          </a:p>
-          <a:p>
-            <a:pPr lvl="0" indent="0" marL="1270000">
-              <a:buNone/>
-            </a:pPr>
-            <a:r>
-              <a:rPr sz="2000" b="1"/>
-              <a:t>Tip with Title</a:t>
-            </a:r>
-          </a:p>
-          <a:p>
-            <a:pPr lvl="0" indent="0" marL="1270000">
-              <a:buNone/>
-            </a:pPr>
-            <a:r>
-              <a:rPr sz="2000"/>
-              <a:t>Add one practical tips or take-home message.</a:t>
+              <a:t>: To work out the relevance of the topic to your students.</a:t>
+            </a:r>
+          </a:p>
+          <a:p>
+            <a:pPr lvl="0"/>
+            <a:r>
+              <a:rPr/>
+              <a:t>In an interactive setting, discuss how the new skills could be applied in practise with specific examples.</a:t>
+            </a:r>
+          </a:p>
+          <a:p>
+            <a:pPr lvl="0"/>
+            <a:r>
+              <a:rPr/>
+              <a:t>Examine downfalls and practical obstacles.</a:t>
             </a:r>
           </a:p>
         </p:txBody>
@@ -5159,39 +5273,38 @@
             </a:pPr>
             <a:r>
               <a:rPr b="1"/>
-              <a:t>Assignment</a:t>
-            </a:r>
-          </a:p>
-          <a:p>
-            <a:pPr lvl="0"/>
+              <a:t>Take-home message</a:t>
+            </a:r>
+          </a:p>
+          <a:p>
+            <a:pPr lvl="0" indent="0" marL="0">
+              <a:buNone/>
+            </a:pPr>
             <a:r>
               <a:rPr b="1"/>
               <a:t>Aim</a:t>
             </a:r>
             <a:r>
               <a:rPr/>
-              <a:t>: Explain the homework assignment and the rationale behind the homework.</a:t>
-            </a:r>
-          </a:p>
-          <a:p>
-            <a:pPr lvl="0"/>
-            <a:r>
-              <a:rPr/>
-              <a:t>Examine whether/how it will be assessed</a:t>
-            </a:r>
-          </a:p>
-          <a:p>
-            <a:pPr lvl="0"/>
-            <a:r>
-              <a:rPr/>
-              <a:t>Mention scoring rubrics, if applicable</a:t>
-            </a:r>
-          </a:p>
-          <a:p>
-            <a:pPr lvl="0"/>
-            <a:r>
-              <a:rPr/>
-              <a:t>Design a peer-review system for assignments to place students in role of reviewer and author</a:t>
+              <a:t>: End lesson on clear take-home message that are interactively compiled by students.</a:t>
+            </a:r>
+          </a:p>
+          <a:p>
+            <a:pPr lvl="0" indent="0" marL="1270000">
+              <a:buNone/>
+            </a:pPr>
+            <a:r>
+              <a:rPr sz="2000" b="1"/>
+              <a:t>Tip with Title</a:t>
+            </a:r>
+          </a:p>
+          <a:p>
+            <a:pPr lvl="0" indent="0" marL="1270000">
+              <a:buNone/>
+            </a:pPr>
+            <a:r>
+              <a:rPr sz="2000"/>
+              <a:t>Add one practical tips or take-home message.</a:t>
             </a:r>
           </a:p>
         </p:txBody>
@@ -5241,7 +5354,7 @@
             </a:pPr>
             <a:r>
               <a:rPr b="1"/>
-              <a:t>To conclude: Survey time!</a:t>
+              <a:t>Assignment</a:t>
             </a:r>
           </a:p>
           <a:p>
@@ -5252,14 +5365,28 @@
             </a:r>
             <a:r>
               <a:rPr/>
-              <a:t>: This post-submodule survey serves to examine students’ current knowledge about the sumodule’s topic.</a:t>
-            </a:r>
-          </a:p>
-          <a:p>
-            <a:pPr lvl="0"/>
-            <a:r>
-              <a:rPr/>
-              <a:t>Use free survey software such as or other survey software (particify, formR) to establish the following questions (shown on separate slides):</a:t>
+              <a:t>: Explain the homework assignment and the rationale behind the homework.</a:t>
+            </a:r>
+          </a:p>
+          <a:p>
+            <a:pPr lvl="0"/>
+            <a:r>
+              <a:rPr/>
+              <a:t>Examine whether/how it will be assessed</a:t>
+            </a:r>
+          </a:p>
+          <a:p>
+            <a:pPr lvl="0"/>
+            <a:r>
+              <a:rPr/>
+              <a:t>Mention scoring rubrics, if applicable</a:t>
+            </a:r>
+          </a:p>
+          <a:p>
+            <a:pPr lvl="0"/>
+            <a:r>
+              <a:rPr/>
+              <a:t>Design a peer-review system for assignments to place students in role of reviewer and author</a:t>
             </a:r>
           </a:p>
         </p:txBody>
@@ -5302,47 +5429,32 @@
           <a:lstStyle/>
           <a:p>
             <a:pPr lvl="0" indent="0" marL="0">
-              <a:buNone/>
-            </a:pPr>
-            <a:r>
-              <a:rPr b="1"/>
-              <a:t>What is your level of familiarity with [Topic] (e.g., basic concepts, terminology, or tools)?</a:t>
-            </a:r>
-          </a:p>
-          <a:p>
-            <a:pPr lvl="0" indent="-342900" marL="342900">
-              <a:buAutoNum type="alphaLcPeriod"/>
-            </a:pPr>
-            <a:r>
-              <a:rPr/>
-              <a:t>I have never heard of it before.</a:t>
-            </a:r>
-          </a:p>
-          <a:p>
-            <a:pPr lvl="0" indent="-342900" marL="342900">
-              <a:buAutoNum type="alphaLcPeriod"/>
-            </a:pPr>
-            <a:r>
-              <a:rPr/>
-              <a:t>I have heard of it but have never worked with it.</a:t>
-            </a:r>
-          </a:p>
-          <a:p>
-            <a:pPr lvl="0" indent="-342900" marL="342900">
-              <a:buAutoNum type="alphaLcPeriod"/>
-            </a:pPr>
-            <a:r>
-              <a:rPr/>
-              <a:t>I have basic understanding and experience with it.</a:t>
-            </a:r>
-          </a:p>
-          <a:p>
-            <a:pPr lvl="0" indent="-342900" marL="342900">
-              <a:buAutoNum type="alphaLcPeriod"/>
-            </a:pPr>
-            <a:r>
-              <a:rPr/>
-              <a:t>I am very familiar and have worked with it extensively.</a:t>
+              <a:spcBef>
+                <a:spcPts val="3000"/>
+              </a:spcBef>
+              <a:buNone/>
+            </a:pPr>
+            <a:r>
+              <a:rPr b="1"/>
+              <a:t>To conclude: Survey time!</a:t>
+            </a:r>
+          </a:p>
+          <a:p>
+            <a:pPr lvl="0"/>
+            <a:r>
+              <a:rPr b="1"/>
+              <a:t>Aim</a:t>
+            </a:r>
+            <a:r>
+              <a:rPr/>
+              <a:t>: This post-submodule survey serves to examine students’ current knowledge about the sumodule’s topic.</a:t>
+            </a:r>
+          </a:p>
+          <a:p>
+            <a:pPr lvl="0"/>
+            <a:r>
+              <a:rPr/>
+              <a:t>Use free survey software such as or other survey software (particify, formR) to establish the following questions (shown on separate slides):</a:t>
             </a:r>
           </a:p>
         </p:txBody>
@@ -5389,7 +5501,7 @@
             </a:pPr>
             <a:r>
               <a:rPr b="1"/>
-              <a:t>Which of the following concepts or skills do you feel most confident about in relation to [Topic]? (Select all that apply)</a:t>
+              <a:t>What is your level of familiarity with [Topic] (e.g., basic concepts, terminology, or tools)?</a:t>
             </a:r>
           </a:p>
           <a:p>
@@ -5398,7 +5510,7 @@
             </a:pPr>
             <a:r>
               <a:rPr/>
-              <a:t>Concept 1</a:t>
+              <a:t>I have never heard of it before.</a:t>
             </a:r>
           </a:p>
           <a:p>
@@ -5407,7 +5519,7 @@
             </a:pPr>
             <a:r>
               <a:rPr/>
-              <a:t>Concept 2</a:t>
+              <a:t>I have heard of it but have never worked with it.</a:t>
             </a:r>
           </a:p>
           <a:p>
@@ -5416,7 +5528,7 @@
             </a:pPr>
             <a:r>
               <a:rPr/>
-              <a:t>Concept 3</a:t>
+              <a:t>I have basic understanding and experience with it.</a:t>
             </a:r>
           </a:p>
           <a:p>
@@ -5425,16 +5537,7 @@
             </a:pPr>
             <a:r>
               <a:rPr/>
-              <a:t>Concept 4</a:t>
-            </a:r>
-          </a:p>
-          <a:p>
-            <a:pPr lvl="0" indent="-342900" marL="342900">
-              <a:buAutoNum type="alphaLcPeriod"/>
-            </a:pPr>
-            <a:r>
-              <a:rPr/>
-              <a:t>I am not sure about any of these concepts.</a:t>
+              <a:t>I am very familiar and have worked with it extensively.</a:t>
             </a:r>
           </a:p>
         </p:txBody>
@@ -5481,7 +5584,7 @@
             </a:pPr>
             <a:r>
               <a:rPr b="1"/>
-              <a:t>On a scale of 1 to 5, how comfortable are you with using [specific tool/technology] related to [Topic]? (1 = Not comfortable at all, 5 = Very comfortable)</a:t>
+              <a:t>Which of the following concepts or skills do you feel most confident about in relation to [Topic]? (Select all that apply)</a:t>
             </a:r>
           </a:p>
           <a:p>
@@ -5490,7 +5593,7 @@
             </a:pPr>
             <a:r>
               <a:rPr/>
-              <a:t>1</a:t>
+              <a:t>Concept 1</a:t>
             </a:r>
           </a:p>
           <a:p>
@@ -5499,7 +5602,7 @@
             </a:pPr>
             <a:r>
               <a:rPr/>
-              <a:t>2</a:t>
+              <a:t>Concept 2</a:t>
             </a:r>
           </a:p>
           <a:p>
@@ -5508,7 +5611,7 @@
             </a:pPr>
             <a:r>
               <a:rPr/>
-              <a:t>3</a:t>
+              <a:t>Concept 3</a:t>
             </a:r>
           </a:p>
           <a:p>
@@ -5517,7 +5620,7 @@
             </a:pPr>
             <a:r>
               <a:rPr/>
-              <a:t>4</a:t>
+              <a:t>Concept 4</a:t>
             </a:r>
           </a:p>
           <a:p>
@@ -5526,7 +5629,7 @@
             </a:pPr>
             <a:r>
               <a:rPr/>
-              <a:t>5</a:t>
+              <a:t>I am not sure about any of these concepts.</a:t>
             </a:r>
           </a:p>
         </p:txBody>
@@ -5569,32 +5672,56 @@
           <a:lstStyle/>
           <a:p>
             <a:pPr lvl="0" indent="0" marL="0">
-              <a:spcBef>
-                <a:spcPts val="3000"/>
-              </a:spcBef>
-              <a:buNone/>
-            </a:pPr>
-            <a:r>
-              <a:rPr b="1"/>
-              <a:t>Discussion of survey results</a:t>
-            </a:r>
-          </a:p>
-          <a:p>
-            <a:pPr lvl="0"/>
-            <a:r>
-              <a:rPr b="1"/>
-              <a:t>Aim</a:t>
-            </a:r>
-            <a:r>
-              <a:rPr/>
-              <a:t>: Briefly examine the answers given to each question interactively with the group.</a:t>
-            </a:r>
-          </a:p>
-          <a:p>
-            <a:pPr lvl="0"/>
-            <a:r>
-              <a:rPr/>
-              <a:t>Compare and highlight specific differences in answers between pre- and post-survey answers</a:t>
+              <a:buNone/>
+            </a:pPr>
+            <a:r>
+              <a:rPr b="1"/>
+              <a:t>On a scale of 1 to 5, how comfortable are you with using [specific tool/technology] related to [Topic]? (1 = Not comfortable at all, 5 = Very comfortable)</a:t>
+            </a:r>
+          </a:p>
+          <a:p>
+            <a:pPr lvl="0" indent="-342900" marL="342900">
+              <a:buAutoNum type="alphaLcPeriod"/>
+            </a:pPr>
+            <a:r>
+              <a:rPr/>
+              <a:t>1</a:t>
+            </a:r>
+          </a:p>
+          <a:p>
+            <a:pPr lvl="0" indent="-342900" marL="342900">
+              <a:buAutoNum type="alphaLcPeriod"/>
+            </a:pPr>
+            <a:r>
+              <a:rPr/>
+              <a:t>2</a:t>
+            </a:r>
+          </a:p>
+          <a:p>
+            <a:pPr lvl="0" indent="-342900" marL="342900">
+              <a:buAutoNum type="alphaLcPeriod"/>
+            </a:pPr>
+            <a:r>
+              <a:rPr/>
+              <a:t>3</a:t>
+            </a:r>
+          </a:p>
+          <a:p>
+            <a:pPr lvl="0" indent="-342900" marL="342900">
+              <a:buAutoNum type="alphaLcPeriod"/>
+            </a:pPr>
+            <a:r>
+              <a:rPr/>
+              <a:t>4</a:t>
+            </a:r>
+          </a:p>
+          <a:p>
+            <a:pPr lvl="0" indent="-342900" marL="342900">
+              <a:buAutoNum type="alphaLcPeriod"/>
+            </a:pPr>
+            <a:r>
+              <a:rPr/>
+              <a:t>5</a:t>
             </a:r>
           </a:p>
         </p:txBody>
@@ -5644,14 +5771,25 @@
             </a:pPr>
             <a:r>
               <a:rPr b="1"/>
-              <a:t>References</a:t>
-            </a:r>
-          </a:p>
-          <a:p>
-            <a:pPr lvl="0"/>
-            <a:r>
-              <a:rPr/>
-              <a:t>Provide literature you refer to throughout this lesson.</a:t>
+              <a:t>Discussion of survey results</a:t>
+            </a:r>
+          </a:p>
+          <a:p>
+            <a:pPr lvl="0"/>
+            <a:r>
+              <a:rPr b="1"/>
+              <a:t>Aim</a:t>
+            </a:r>
+            <a:r>
+              <a:rPr/>
+              <a:t>: Briefly examine the answers given to each question interactively with the group.</a:t>
+            </a:r>
+          </a:p>
+          <a:p>
+            <a:pPr lvl="0"/>
+            <a:r>
+              <a:rPr/>
+              <a:t>Compare and highlight specific differences in answers between pre- and post-survey answers</a:t>
             </a:r>
           </a:p>
         </p:txBody>
@@ -5680,12 +5818,12 @@
       </p:grpSpPr>
       <p:sp>
         <p:nvSpPr>
-          <p:cNvPr id="2" name="Title 1"/>
-          <p:cNvSpPr>
-            <a:spLocks noGrp="1"/>
-          </p:cNvSpPr>
-          <p:nvPr>
-            <p:ph type="title"/>
+          <p:cNvPr id="3" name="Content Placeholder 2"/>
+          <p:cNvSpPr>
+            <a:spLocks noGrp="1"/>
+          </p:cNvSpPr>
+          <p:nvPr>
+            <p:ph idx="1"/>
           </p:nvPr>
         </p:nvSpPr>
         <p:spPr/>
@@ -5694,36 +5832,21 @@
           <a:lstStyle/>
           <a:p>
             <a:pPr lvl="0" indent="0" marL="0">
-              <a:buNone/>
-            </a:pPr>
-            <a:r>
-              <a:rPr/>
-              <a:t>Thanks! </a:t>
-            </a:r>
-          </a:p>
-        </p:txBody>
-      </p:sp>
-      <p:sp>
-        <p:nvSpPr>
-          <p:cNvPr id="3" name="Content Placeholder 2"/>
-          <p:cNvSpPr>
-            <a:spLocks noGrp="1"/>
-          </p:cNvSpPr>
-          <p:nvPr>
-            <p:ph idx="1"/>
-          </p:nvPr>
-        </p:nvSpPr>
-        <p:spPr/>
-        <p:txBody>
-          <a:bodyPr/>
-          <a:lstStyle/>
-          <a:p>
-            <a:pPr lvl="0" indent="0" marL="0">
-              <a:buNone/>
-            </a:pPr>
-            <a:r>
-              <a:rPr/>
-              <a:t>See you next class :)</a:t>
+              <a:spcBef>
+                <a:spcPts val="3000"/>
+              </a:spcBef>
+              <a:buNone/>
+            </a:pPr>
+            <a:r>
+              <a:rPr b="1"/>
+              <a:t>References</a:t>
+            </a:r>
+          </a:p>
+          <a:p>
+            <a:pPr lvl="0"/>
+            <a:r>
+              <a:rPr/>
+              <a:t>Provide literature you refer to throughout this lesson.</a:t>
             </a:r>
           </a:p>
         </p:txBody>
@@ -5959,7 +6082,7 @@
                       </a:pPr>
                       <a:r>
                         <a:rPr>
-                          <a:hlinkClick r:id="rId2"/>
+                          <a:hlinkClick r:id="rId3"/>
                         </a:rPr>
                         <a:t>Download Link</a:t>
                       </a:r>
@@ -5995,6 +6118,31 @@
       </p:grpSpPr>
       <p:sp>
         <p:nvSpPr>
+          <p:cNvPr id="2" name="Title 1"/>
+          <p:cNvSpPr>
+            <a:spLocks noGrp="1"/>
+          </p:cNvSpPr>
+          <p:nvPr>
+            <p:ph type="title"/>
+          </p:nvPr>
+        </p:nvSpPr>
+        <p:spPr/>
+        <p:txBody>
+          <a:bodyPr/>
+          <a:lstStyle/>
+          <a:p>
+            <a:pPr lvl="0" indent="0" marL="0">
+              <a:buNone/>
+            </a:pPr>
+            <a:r>
+              <a:rPr/>
+              <a:t>Thanks! </a:t>
+            </a:r>
+          </a:p>
+        </p:txBody>
+      </p:sp>
+      <p:sp>
+        <p:nvSpPr>
           <p:cNvPr id="3" name="Content Placeholder 2"/>
           <p:cNvSpPr>
             <a:spLocks noGrp="1"/>
@@ -6009,42 +6157,11 @@
           <a:lstStyle/>
           <a:p>
             <a:pPr lvl="0" indent="0" marL="0">
-              <a:spcBef>
-                <a:spcPts val="3000"/>
-              </a:spcBef>
-              <a:buNone/>
-            </a:pPr>
-            <a:r>
-              <a:rPr b="1"/>
-              <a:t>Pedagogical add-on tools for instructors</a:t>
-            </a:r>
-          </a:p>
-          <a:p>
-            <a:pPr lvl="0"/>
-            <a:r>
-              <a:rPr/>
-              <a:t>This section is dedicated to ideas on how to incorporate pedagogical tools into teaching for this specific submodule topic. This could mean:</a:t>
-            </a:r>
-          </a:p>
-          <a:p>
-            <a:pPr lvl="1"/>
-            <a:r>
-              <a:rPr/>
-              <a:t>Information about the scientific evidence on the theory of the pedagogical add-on tool and the evidence for its efficacy.</a:t>
-            </a:r>
-          </a:p>
-          <a:p>
-            <a:pPr lvl="1"/>
-            <a:r>
-              <a:rPr/>
-              <a:t>Discussion/reflection on how tools can be incorporated into the teaching for this particular content.</a:t>
-            </a:r>
-          </a:p>
-          <a:p>
-            <a:pPr lvl="1"/>
-            <a:r>
-              <a:rPr/>
-              <a:t>Extra exercises for faster students.</a:t>
+              <a:buNone/>
+            </a:pPr>
+            <a:r>
+              <a:rPr/>
+              <a:t>See you next class :)</a:t>
             </a:r>
           </a:p>
         </p:txBody>
@@ -6094,29 +6211,35 @@
             </a:pPr>
             <a:r>
               <a:rPr b="1"/>
-              <a:t>Additional literature for instructors</a:t>
-            </a:r>
-          </a:p>
-          <a:p>
-            <a:pPr lvl="0"/>
-            <a:r>
-              <a:rPr/>
-              <a:t>References for content</a:t>
-            </a:r>
-          </a:p>
-          <a:p>
-            <a:pPr lvl="0"/>
-            <a:r>
-              <a:rPr/>
-              <a:t>References for pedagogical add-on tools</a:t>
-            </a:r>
-            <a:br/>
-          </a:p>
-          <a:p>
-            <a:pPr lvl="0"/>
-            <a:r>
-              <a:rPr/>
-              <a:t>Other resources (videos etc.)</a:t>
+              <a:t>Pedagogical add-on tools for instructors</a:t>
+            </a:r>
+          </a:p>
+          <a:p>
+            <a:pPr lvl="0"/>
+            <a:r>
+              <a:rPr/>
+              <a:t>This section is dedicated to ideas on how to incorporate pedagogical tools into teaching for this specific submodule topic. This could mean:</a:t>
+            </a:r>
+          </a:p>
+          <a:p>
+            <a:pPr lvl="1"/>
+            <a:r>
+              <a:rPr/>
+              <a:t>Information about the scientific evidence on the theory of the pedagogical add-on tool and the evidence for its efficacy.</a:t>
+            </a:r>
+          </a:p>
+          <a:p>
+            <a:pPr lvl="1"/>
+            <a:r>
+              <a:rPr/>
+              <a:t>Discussion/reflection on how tools can be incorporated into the teaching for this particular content.</a:t>
+            </a:r>
+          </a:p>
+          <a:p>
+            <a:pPr lvl="1"/>
+            <a:r>
+              <a:rPr/>
+              <a:t>Extra exercises for faster students.</a:t>
             </a:r>
           </a:p>
         </p:txBody>
@@ -6145,12 +6268,12 @@
       </p:grpSpPr>
       <p:sp>
         <p:nvSpPr>
-          <p:cNvPr id="2" name="Title 1"/>
-          <p:cNvSpPr>
-            <a:spLocks noGrp="1"/>
-          </p:cNvSpPr>
-          <p:nvPr>
-            <p:ph type="title"/>
+          <p:cNvPr id="3" name="Content Placeholder 2"/>
+          <p:cNvSpPr>
+            <a:spLocks noGrp="1"/>
+          </p:cNvSpPr>
+          <p:nvPr>
+            <p:ph idx="1"/>
           </p:nvPr>
         </p:nvSpPr>
         <p:spPr/>
@@ -6159,38 +6282,36 @@
           <a:lstStyle/>
           <a:p>
             <a:pPr lvl="0" indent="0" marL="0">
-              <a:buNone/>
-            </a:pPr>
-            <a:r>
-              <a:rPr/>
-              <a:t>Formatting elements for instructors</a:t>
-            </a:r>
-          </a:p>
-        </p:txBody>
-      </p:sp>
-      <p:sp>
-        <p:nvSpPr>
-          <p:cNvPr id="3" name="Content Placeholder 2"/>
-          <p:cNvSpPr>
-            <a:spLocks noGrp="1"/>
-          </p:cNvSpPr>
-          <p:nvPr>
-            <p:ph idx="1"/>
-          </p:nvPr>
-        </p:nvSpPr>
-        <p:spPr/>
-        <p:txBody>
-          <a:bodyPr/>
-          <a:lstStyle/>
-          <a:p>
-            <a:pPr lvl="0"/>
-            <a:r>
-              <a:rPr b="1"/>
-              <a:t>Aim</a:t>
-            </a:r>
-            <a:r>
-              <a:rPr/>
-              <a:t>: This section contains templates for different formatting elements, which can be modified and adapted for the instructor’s individual purposes.</a:t>
+              <a:spcBef>
+                <a:spcPts val="3000"/>
+              </a:spcBef>
+              <a:buNone/>
+            </a:pPr>
+            <a:r>
+              <a:rPr b="1"/>
+              <a:t>Additional literature for instructors</a:t>
+            </a:r>
+          </a:p>
+          <a:p>
+            <a:pPr lvl="0"/>
+            <a:r>
+              <a:rPr/>
+              <a:t>References for content</a:t>
+            </a:r>
+          </a:p>
+          <a:p>
+            <a:pPr lvl="0"/>
+            <a:r>
+              <a:rPr/>
+              <a:t>References for pedagogical add-on tools</a:t>
+            </a:r>
+            <a:br/>
+          </a:p>
+          <a:p>
+            <a:pPr lvl="0"/>
+            <a:r>
+              <a:rPr/>
+              <a:t>Other resources (videos etc.)</a:t>
             </a:r>
           </a:p>
         </p:txBody>
@@ -6219,6 +6340,31 @@
       </p:grpSpPr>
       <p:sp>
         <p:nvSpPr>
+          <p:cNvPr id="2" name="Title 1"/>
+          <p:cNvSpPr>
+            <a:spLocks noGrp="1"/>
+          </p:cNvSpPr>
+          <p:nvPr>
+            <p:ph type="title"/>
+          </p:nvPr>
+        </p:nvSpPr>
+        <p:spPr/>
+        <p:txBody>
+          <a:bodyPr/>
+          <a:lstStyle/>
+          <a:p>
+            <a:pPr lvl="0" indent="0" marL="0">
+              <a:buNone/>
+            </a:pPr>
+            <a:r>
+              <a:rPr/>
+              <a:t>Formatting elements for instructors</a:t>
+            </a:r>
+          </a:p>
+        </p:txBody>
+      </p:sp>
+      <p:sp>
+        <p:nvSpPr>
           <p:cNvPr id="3" name="Content Placeholder 2"/>
           <p:cNvSpPr>
             <a:spLocks noGrp="1"/>
@@ -6232,51 +6378,14 @@
           <a:bodyPr/>
           <a:lstStyle/>
           <a:p>
-            <a:pPr lvl="0" indent="0" marL="0">
-              <a:spcBef>
-                <a:spcPts val="3000"/>
-              </a:spcBef>
-              <a:buNone/>
-            </a:pPr>
-            <a:r>
-              <a:rPr b="1"/>
-              <a:t>Text with example links</a:t>
-            </a:r>
-          </a:p>
-          <a:p>
-            <a:pPr lvl="0"/>
-            <a:r>
-              <a:rPr>
-                <a:hlinkClick r:id="rId2"/>
-              </a:rPr>
-              <a:t>Quarto Documentation</a:t>
-            </a:r>
-          </a:p>
-          <a:p>
-            <a:pPr lvl="0"/>
-            <a:r>
-              <a:rPr>
-                <a:hlinkClick r:id="rId3"/>
-              </a:rPr>
-              <a:t>Reveal.js Documentation</a:t>
-            </a:r>
-          </a:p>
-          <a:p>
-            <a:pPr lvl="0"/>
-            <a:r>
-              <a:rPr>
-                <a:hlinkClick r:id="rId4"/>
-              </a:rPr>
-              <a:t>Markdown Guide</a:t>
-            </a:r>
-          </a:p>
-          <a:p>
-            <a:pPr lvl="0"/>
-            <a:r>
-              <a:rPr>
-                <a:hlinkClick r:id="rId5"/>
-              </a:rPr>
-              <a:t>GitHub</a:t>
+            <a:pPr lvl="0"/>
+            <a:r>
+              <a:rPr b="1"/>
+              <a:t>Aim</a:t>
+            </a:r>
+            <a:r>
+              <a:rPr/>
+              <a:t>: This section contains templates for different formatting elements, which can be modified and adapted for the instructor’s individual purposes.</a:t>
             </a:r>
           </a:p>
         </p:txBody>
@@ -6326,133 +6435,43 @@
             </a:pPr>
             <a:r>
               <a:rPr b="1"/>
-              <a:t>Basic text formatting</a:t>
-            </a:r>
-          </a:p>
-          <a:p>
-            <a:pPr lvl="0"/>
-            <a:r>
-              <a:rPr b="1"/>
-              <a:t>Bold:</a:t>
-            </a:r>
-            <a:r>
-              <a:rPr/>
-              <a:t> </a:t>
-            </a:r>
+              <a:t>Text with example links</a:t>
+            </a:r>
+          </a:p>
+          <a:p>
+            <a:pPr lvl="0"/>
             <a:r>
               <a:rPr>
-                <a:latin typeface="Courier"/>
+                <a:hlinkClick r:id="rId2"/>
               </a:rPr>
-              <a:t>**bold**</a:t>
-            </a:r>
-            <a:r>
-              <a:rPr/>
-              <a:t> → </a:t>
-            </a:r>
-            <a:r>
-              <a:rPr b="1"/>
-              <a:t>bold</a:t>
-            </a:r>
-          </a:p>
-          <a:p>
-            <a:pPr lvl="0"/>
-            <a:r>
-              <a:rPr i="1"/>
-              <a:t>Italic:</a:t>
-            </a:r>
-            <a:r>
-              <a:rPr/>
-              <a:t> </a:t>
-            </a:r>
+              <a:t>Quarto Documentation</a:t>
+            </a:r>
+          </a:p>
+          <a:p>
+            <a:pPr lvl="0"/>
             <a:r>
               <a:rPr>
-                <a:latin typeface="Courier"/>
+                <a:hlinkClick r:id="rId3"/>
               </a:rPr>
-              <a:t>*italic*</a:t>
-            </a:r>
-            <a:r>
-              <a:rPr/>
-              <a:t> → </a:t>
-            </a:r>
-            <a:r>
-              <a:rPr i="1"/>
-              <a:t>italic</a:t>
-            </a:r>
-          </a:p>
-          <a:p>
-            <a:pPr lvl="0"/>
-            <a:r>
-              <a:rPr strike="sngStrike"/>
-              <a:t>Strikethrough:</a:t>
-            </a:r>
-            <a:r>
-              <a:rPr/>
-              <a:t> </a:t>
-            </a:r>
+              <a:t>Reveal.js Documentation</a:t>
+            </a:r>
+          </a:p>
+          <a:p>
+            <a:pPr lvl="0"/>
             <a:r>
               <a:rPr>
-                <a:latin typeface="Courier"/>
+                <a:hlinkClick r:id="rId4"/>
               </a:rPr>
-              <a:t>~~text~~</a:t>
-            </a:r>
-            <a:r>
-              <a:rPr/>
-              <a:t> → </a:t>
-            </a:r>
-            <a:r>
-              <a:rPr strike="sngStrike"/>
-              <a:t>text</a:t>
+              <a:t>Markdown Guide</a:t>
             </a:r>
           </a:p>
           <a:p>
             <a:pPr lvl="0"/>
             <a:r>
               <a:rPr>
-                <a:latin typeface="Courier"/>
+                <a:hlinkClick r:id="rId5"/>
               </a:rPr>
-              <a:t>Inline code:</a:t>
-            </a:r>
-            <a:r>
-              <a:rPr/>
-              <a:t> </a:t>
-            </a:r>
-            <a:r>
-              <a:rPr>
-                <a:latin typeface="Courier"/>
-              </a:rPr>
-              <a:t>`code`</a:t>
-            </a:r>
-            <a:r>
-              <a:rPr/>
-              <a:t> → </a:t>
-            </a:r>
-            <a:r>
-              <a:rPr>
-                <a:latin typeface="Courier"/>
-              </a:rPr>
-              <a:t>code</a:t>
-            </a:r>
-          </a:p>
-          <a:p>
-            <a:pPr lvl="0" indent="0" marL="1270000"/>
-            <a:r>
-              <a:rPr sz="2000"/>
-              <a:t>Blockquote: </a:t>
-            </a:r>
-            <a:r>
-              <a:rPr sz="2000">
-                <a:latin typeface="Courier"/>
-              </a:rPr>
-              <a:t>&gt; Quote</a:t>
-            </a:r>
-            <a:r>
-              <a:rPr sz="2000"/>
-              <a:t> →</a:t>
-            </a:r>
-            <a:br/>
-            <a:r>
-              <a:rPr sz="2000"/>
-              <a:t>“This is a quote”</a:t>
+              <a:t>GitHub</a:t>
             </a:r>
           </a:p>
         </p:txBody>
@@ -6502,28 +6521,133 @@
             </a:pPr>
             <a:r>
               <a:rPr b="1"/>
-              <a:t>Figure with caption</a:t>
-            </a:r>
-          </a:p>
-          <a:p>
-            <a:pPr lvl="0"/>
-            <a:r>
-              <a:rPr/>
-              <a:t>Centered image and caption below in italics</a:t>
-            </a:r>
-          </a:p>
-          <a:p>
-            <a:pPr lvl="0" indent="0" marL="0">
-              <a:buNone/>
-            </a:pPr>
-          </a:p>
-          <a:p>
-            <a:pPr lvl="0" indent="0" marL="0">
-              <a:buNone/>
-            </a:pPr>
-            <a:r>
-              <a:rPr/>
-              <a:t>This is a Penguin.</a:t>
+              <a:t>Basic text formatting</a:t>
+            </a:r>
+          </a:p>
+          <a:p>
+            <a:pPr lvl="0"/>
+            <a:r>
+              <a:rPr b="1"/>
+              <a:t>Bold:</a:t>
+            </a:r>
+            <a:r>
+              <a:rPr/>
+              <a:t> </a:t>
+            </a:r>
+            <a:r>
+              <a:rPr>
+                <a:latin typeface="Courier"/>
+              </a:rPr>
+              <a:t>**bold**</a:t>
+            </a:r>
+            <a:r>
+              <a:rPr/>
+              <a:t> → </a:t>
+            </a:r>
+            <a:r>
+              <a:rPr b="1"/>
+              <a:t>bold</a:t>
+            </a:r>
+          </a:p>
+          <a:p>
+            <a:pPr lvl="0"/>
+            <a:r>
+              <a:rPr i="1"/>
+              <a:t>Italic:</a:t>
+            </a:r>
+            <a:r>
+              <a:rPr/>
+              <a:t> </a:t>
+            </a:r>
+            <a:r>
+              <a:rPr>
+                <a:latin typeface="Courier"/>
+              </a:rPr>
+              <a:t>*italic*</a:t>
+            </a:r>
+            <a:r>
+              <a:rPr/>
+              <a:t> → </a:t>
+            </a:r>
+            <a:r>
+              <a:rPr i="1"/>
+              <a:t>italic</a:t>
+            </a:r>
+          </a:p>
+          <a:p>
+            <a:pPr lvl="0"/>
+            <a:r>
+              <a:rPr strike="sngStrike"/>
+              <a:t>Strikethrough:</a:t>
+            </a:r>
+            <a:r>
+              <a:rPr/>
+              <a:t> </a:t>
+            </a:r>
+            <a:r>
+              <a:rPr>
+                <a:latin typeface="Courier"/>
+              </a:rPr>
+              <a:t>~~text~~</a:t>
+            </a:r>
+            <a:r>
+              <a:rPr/>
+              <a:t> → </a:t>
+            </a:r>
+            <a:r>
+              <a:rPr strike="sngStrike"/>
+              <a:t>text</a:t>
+            </a:r>
+          </a:p>
+          <a:p>
+            <a:pPr lvl="0"/>
+            <a:r>
+              <a:rPr>
+                <a:latin typeface="Courier"/>
+              </a:rPr>
+              <a:t>Inline code:</a:t>
+            </a:r>
+            <a:r>
+              <a:rPr/>
+              <a:t> </a:t>
+            </a:r>
+            <a:r>
+              <a:rPr>
+                <a:latin typeface="Courier"/>
+              </a:rPr>
+              <a:t>`code`</a:t>
+            </a:r>
+            <a:r>
+              <a:rPr/>
+              <a:t> → </a:t>
+            </a:r>
+            <a:r>
+              <a:rPr>
+                <a:latin typeface="Courier"/>
+              </a:rPr>
+              <a:t>code</a:t>
+            </a:r>
+          </a:p>
+          <a:p>
+            <a:pPr lvl="0" indent="0" marL="1270000"/>
+            <a:r>
+              <a:rPr sz="2000"/>
+              <a:t>Blockquote: </a:t>
+            </a:r>
+            <a:r>
+              <a:rPr sz="2000">
+                <a:latin typeface="Courier"/>
+              </a:rPr>
+              <a:t>&gt; Quote</a:t>
+            </a:r>
+            <a:r>
+              <a:rPr sz="2000"/>
+              <a:t> →</a:t>
+            </a:r>
+            <a:br/>
+            <a:r>
+              <a:rPr sz="2000"/>
+              <a:t>“This is a quote”</a:t>
             </a:r>
           </a:p>
         </p:txBody>
@@ -6573,7 +6697,14 @@
             </a:pPr>
             <a:r>
               <a:rPr b="1"/>
-              <a:t>Figure with bullet points</a:t>
+              <a:t>Figure with caption</a:t>
+            </a:r>
+          </a:p>
+          <a:p>
+            <a:pPr lvl="0"/>
+            <a:r>
+              <a:rPr/>
+              <a:t>Centered image and caption below in italics</a:t>
             </a:r>
           </a:p>
           <a:p>
@@ -6582,24 +6713,12 @@
             </a:pPr>
           </a:p>
           <a:p>
-            <a:pPr lvl="0"/>
-            <a:r>
-              <a:rPr/>
-              <a:t>First bullet point</a:t>
-            </a:r>
-          </a:p>
-          <a:p>
-            <a:pPr lvl="0"/>
-            <a:r>
-              <a:rPr/>
-              <a:t>Second bullet point</a:t>
-            </a:r>
-          </a:p>
-          <a:p>
-            <a:pPr lvl="0"/>
-            <a:r>
-              <a:rPr/>
-              <a:t>Third bullet point</a:t>
+            <a:pPr lvl="0" indent="0" marL="0">
+              <a:buNone/>
+            </a:pPr>
+            <a:r>
+              <a:rPr/>
+              <a:t>This is a Penguin.</a:t>
             </a:r>
           </a:p>
         </p:txBody>
@@ -6649,7 +6768,33 @@
             </a:pPr>
             <a:r>
               <a:rPr b="1"/>
-              <a:t>Side-by-side figures</a:t>
+              <a:t>Figure with bullet points</a:t>
+            </a:r>
+          </a:p>
+          <a:p>
+            <a:pPr lvl="0" indent="0" marL="0">
+              <a:buNone/>
+            </a:pPr>
+          </a:p>
+          <a:p>
+            <a:pPr lvl="0"/>
+            <a:r>
+              <a:rPr/>
+              <a:t>First bullet point</a:t>
+            </a:r>
+          </a:p>
+          <a:p>
+            <a:pPr lvl="0"/>
+            <a:r>
+              <a:rPr/>
+              <a:t>Second bullet point</a:t>
+            </a:r>
+          </a:p>
+          <a:p>
+            <a:pPr lvl="0"/>
+            <a:r>
+              <a:rPr/>
+              <a:t>Third bullet point</a:t>
             </a:r>
           </a:p>
         </p:txBody>
@@ -6699,33 +6844,7 @@
             </a:pPr>
             <a:r>
               <a:rPr b="1"/>
-              <a:t>Stacked figures with text</a:t>
-            </a:r>
-          </a:p>
-          <a:p>
-            <a:pPr lvl="0" indent="0" marL="0">
-              <a:buNone/>
-            </a:pPr>
-          </a:p>
-          <a:p>
-            <a:pPr lvl="0"/>
-            <a:r>
-              <a:rPr/>
-              <a:t>First bullet point</a:t>
-            </a:r>
-          </a:p>
-          <a:p>
-            <a:pPr lvl="0"/>
-            <a:r>
-              <a:rPr/>
-              <a:t>Second bullet point</a:t>
-            </a:r>
-          </a:p>
-          <a:p>
-            <a:pPr lvl="0"/>
-            <a:r>
-              <a:rPr/>
-              <a:t>Third bullet point</a:t>
+              <a:t>Side-by-side figures</a:t>
             </a:r>
           </a:p>
         </p:txBody>
@@ -6775,58 +6894,33 @@
             </a:pPr>
             <a:r>
               <a:rPr b="1"/>
-              <a:t>Two-column text slide</a:t>
+              <a:t>Stacked figures with text</a:t>
             </a:r>
           </a:p>
           <a:p>
             <a:pPr lvl="0" indent="0" marL="0">
               <a:buNone/>
             </a:pPr>
-            <a:r>
-              <a:rPr b="1"/>
-              <a:t>Column 1</a:t>
-            </a:r>
-          </a:p>
-          <a:p>
-            <a:pPr lvl="0" indent="0" marL="0">
-              <a:buNone/>
-            </a:pPr>
-            <a:r>
-              <a:rPr/>
-              <a:t>Lorem ipsum dolor sit amet, consectetur adipiscing elit.</a:t>
-            </a:r>
-            <a:br/>
-            <a:r>
-              <a:rPr/>
-              <a:t>Vivamus lacinia odio vitae vestibulum vestibulum.</a:t>
-            </a:r>
-            <a:br/>
-            <a:r>
-              <a:rPr/>
-              <a:t>Cras venenatis euismod malesuada.</a:t>
-            </a:r>
-          </a:p>
-          <a:p>
-            <a:pPr lvl="0" indent="0" marL="0">
-              <a:buNone/>
-            </a:pPr>
-            <a:r>
-              <a:rPr b="1"/>
-              <a:t>Column 2</a:t>
-            </a:r>
-          </a:p>
-          <a:p>
-            <a:pPr lvl="0" indent="0" marL="0">
-              <a:buNone/>
-            </a:pPr>
-            <a:r>
-              <a:rPr/>
-              <a:t>Sed do eiusmod tempor incididunt ut labore et dolore magna aliqua.</a:t>
-            </a:r>
-            <a:br/>
-            <a:r>
-              <a:rPr/>
-              <a:t>Ut enim ad minim veniam, quis nostrud exercitation ullamco laboris.</a:t>
+          </a:p>
+          <a:p>
+            <a:pPr lvl="0"/>
+            <a:r>
+              <a:rPr/>
+              <a:t>First bullet point</a:t>
+            </a:r>
+          </a:p>
+          <a:p>
+            <a:pPr lvl="0"/>
+            <a:r>
+              <a:rPr/>
+              <a:t>Second bullet point</a:t>
+            </a:r>
+          </a:p>
+          <a:p>
+            <a:pPr lvl="0"/>
+            <a:r>
+              <a:rPr/>
+              <a:t>Third bullet point</a:t>
             </a:r>
           </a:p>
         </p:txBody>
@@ -6958,7 +7052,7 @@
             </a:pPr>
             <a:r>
               <a:rPr b="1"/>
-              <a:t>Three-column text slide</a:t>
+              <a:t>Two-column text slide</a:t>
             </a:r>
           </a:p>
           <a:p>
@@ -6983,6 +7077,11 @@
               <a:rPr/>
               <a:t>Vivamus lacinia odio vitae vestibulum vestibulum.</a:t>
             </a:r>
+            <a:br/>
+            <a:r>
+              <a:rPr/>
+              <a:t>Cras venenatis euismod malesuada.</a:t>
+            </a:r>
           </a:p>
           <a:p>
             <a:pPr lvl="0" indent="0" marL="0">
@@ -7005,24 +7104,6 @@
             <a:r>
               <a:rPr/>
               <a:t>Ut enim ad minim veniam, quis nostrud exercitation ullamco laboris.</a:t>
-            </a:r>
-          </a:p>
-          <a:p>
-            <a:pPr lvl="0" indent="0" marL="0">
-              <a:buNone/>
-            </a:pPr>
-            <a:r>
-              <a:rPr b="1"/>
-              <a:t>Column 3</a:t>
-            </a:r>
-          </a:p>
-          <a:p>
-            <a:pPr lvl="0" indent="0" marL="0">
-              <a:buNone/>
-            </a:pPr>
-            <a:r>
-              <a:rPr/>
-              <a:t>Duis aute irure dolor in reprehenderit in voluptate velit esse cillum dolore eu fugiat nulla pariatur.</a:t>
             </a:r>
           </a:p>
         </p:txBody>
@@ -7051,12 +7132,12 @@
       </p:grpSpPr>
       <p:sp>
         <p:nvSpPr>
-          <p:cNvPr id="4" name="Text Placeholder 3"/>
-          <p:cNvSpPr>
-            <a:spLocks noGrp="1"/>
-          </p:cNvSpPr>
-          <p:nvPr>
-            <p:ph idx="2" sz="half" type="body"/>
+          <p:cNvPr id="3" name="Content Placeholder 2"/>
+          <p:cNvSpPr>
+            <a:spLocks noGrp="1"/>
+          </p:cNvSpPr>
+          <p:nvPr>
+            <p:ph idx="1"/>
           </p:nvPr>
         </p:nvSpPr>
         <p:spPr/>
@@ -7072,278 +7153,75 @@
             </a:pPr>
             <a:r>
               <a:rPr b="1"/>
-              <a:t>Simple table</a:t>
-            </a:r>
-          </a:p>
-        </p:txBody>
-      </p:sp>
-      <p:graphicFrame>
-        <p:nvGraphicFramePr>
-          <p:cNvPr id="6" name="Content Placeholder 5"/>
-          <p:cNvGraphicFramePr>
-            <a:graphicFrameLocks noGrp="1"/>
-          </p:cNvGraphicFramePr>
-          <p:nvPr>
-            <p:ph idx="1"/>
-          </p:nvPr>
-        </p:nvGraphicFramePr>
-        <p:xfrm>
-          <a:off x="3568700" y="203200"/>
-          <a:ext cx="5105400" cy="4381500"/>
-        </p:xfrm>
-        <a:graphic>
-          <a:graphicData uri="http://schemas.openxmlformats.org/drawingml/2006/table">
-            <a:tbl>
-              <a:tblPr firstRow="1" bandRow="1">
-                <a:tableStyleId>{5C22544A-7EE6-4342-B048-85BDC9FD1C3A}</a:tableStyleId>
-              </a:tblPr>
-              <a:tblGrid>
-                <a:gridCol w="1701800"/>
-                <a:gridCol w="1701800"/>
-                <a:gridCol w="1701800"/>
-              </a:tblGrid>
-              <a:tr h="0">
-                <a:tc>
-                  <a:txBody>
-                    <a:bodyPr/>
-                    <a:lstStyle/>
-                    <a:p>
-                      <a:pPr lvl="0" indent="0" marL="0">
-                        <a:buNone/>
-                      </a:pPr>
-                      <a:r>
-                        <a:rPr/>
-                        <a:t>Column 1</a:t>
-                      </a:r>
-                    </a:p>
-                  </a:txBody>
-                  <a:tcPr/>
-                </a:tc>
-                <a:tc>
-                  <a:txBody>
-                    <a:bodyPr/>
-                    <a:lstStyle/>
-                    <a:p>
-                      <a:pPr lvl="0" indent="0" marL="0">
-                        <a:buNone/>
-                      </a:pPr>
-                      <a:r>
-                        <a:rPr/>
-                        <a:t>Column 2</a:t>
-                      </a:r>
-                    </a:p>
-                  </a:txBody>
-                  <a:tcPr/>
-                </a:tc>
-                <a:tc>
-                  <a:txBody>
-                    <a:bodyPr/>
-                    <a:lstStyle/>
-                    <a:p>
-                      <a:pPr lvl="0" indent="0" marL="0">
-                        <a:buNone/>
-                      </a:pPr>
-                      <a:r>
-                        <a:rPr/>
-                        <a:t>Column 3</a:t>
-                      </a:r>
-                    </a:p>
-                  </a:txBody>
-                  <a:tcPr/>
-                </a:tc>
-              </a:tr>
-              <a:tr h="0">
-                <a:tc>
-                  <a:txBody>
-                    <a:bodyPr/>
-                    <a:lstStyle/>
-                    <a:p>
-                      <a:pPr lvl="0" indent="0" marL="0">
-                        <a:buNone/>
-                      </a:pPr>
-                      <a:r>
-                        <a:rPr/>
-                        <a:t>Row 1 Cell</a:t>
-                      </a:r>
-                    </a:p>
-                  </a:txBody>
-                </a:tc>
-                <a:tc>
-                  <a:txBody>
-                    <a:bodyPr/>
-                    <a:lstStyle/>
-                    <a:p>
-                      <a:pPr lvl="0" indent="0" marL="0">
-                        <a:buNone/>
-                      </a:pPr>
-                      <a:r>
-                        <a:rPr/>
-                        <a:t>Row 1 Cell</a:t>
-                      </a:r>
-                    </a:p>
-                  </a:txBody>
-                </a:tc>
-                <a:tc>
-                  <a:txBody>
-                    <a:bodyPr/>
-                    <a:lstStyle/>
-                    <a:p>
-                      <a:pPr lvl="0" indent="0" marL="0">
-                        <a:buNone/>
-                      </a:pPr>
-                      <a:r>
-                        <a:rPr/>
-                        <a:t>Row 1 Cell</a:t>
-                      </a:r>
-                    </a:p>
-                  </a:txBody>
-                </a:tc>
-              </a:tr>
-              <a:tr h="0">
-                <a:tc>
-                  <a:txBody>
-                    <a:bodyPr/>
-                    <a:lstStyle/>
-                    <a:p>
-                      <a:pPr lvl="0" indent="0" marL="0">
-                        <a:buNone/>
-                      </a:pPr>
-                      <a:r>
-                        <a:rPr/>
-                        <a:t>Row 2 Cell</a:t>
-                      </a:r>
-                    </a:p>
-                  </a:txBody>
-                </a:tc>
-                <a:tc>
-                  <a:txBody>
-                    <a:bodyPr/>
-                    <a:lstStyle/>
-                    <a:p>
-                      <a:pPr lvl="0" indent="0" marL="0">
-                        <a:buNone/>
-                      </a:pPr>
-                      <a:r>
-                        <a:rPr/>
-                        <a:t>Row 2 Cell</a:t>
-                      </a:r>
-                    </a:p>
-                  </a:txBody>
-                </a:tc>
-                <a:tc>
-                  <a:txBody>
-                    <a:bodyPr/>
-                    <a:lstStyle/>
-                    <a:p>
-                      <a:pPr lvl="0" indent="0" marL="0">
-                        <a:buNone/>
-                      </a:pPr>
-                      <a:r>
-                        <a:rPr/>
-                        <a:t>Row 2 Cell</a:t>
-                      </a:r>
-                    </a:p>
-                  </a:txBody>
-                </a:tc>
-              </a:tr>
-              <a:tr h="0">
-                <a:tc>
-                  <a:txBody>
-                    <a:bodyPr/>
-                    <a:lstStyle/>
-                    <a:p>
-                      <a:pPr lvl="0" indent="0" marL="0">
-                        <a:buNone/>
-                      </a:pPr>
-                      <a:r>
-                        <a:rPr/>
-                        <a:t>Row 3 Cell</a:t>
-                      </a:r>
-                    </a:p>
-                  </a:txBody>
-                </a:tc>
-                <a:tc>
-                  <a:txBody>
-                    <a:bodyPr/>
-                    <a:lstStyle/>
-                    <a:p>
-                      <a:pPr lvl="0" indent="0" marL="0">
-                        <a:buNone/>
-                      </a:pPr>
-                      <a:r>
-                        <a:rPr/>
-                        <a:t>Row 3 Cell</a:t>
-                      </a:r>
-                    </a:p>
-                  </a:txBody>
-                </a:tc>
-                <a:tc>
-                  <a:txBody>
-                    <a:bodyPr/>
-                    <a:lstStyle/>
-                    <a:p>
-                      <a:pPr lvl="0" indent="0" marL="0">
-                        <a:buNone/>
-                      </a:pPr>
-                      <a:r>
-                        <a:rPr/>
-                        <a:t>Row 3 Cell</a:t>
-                      </a:r>
-                    </a:p>
-                  </a:txBody>
-                </a:tc>
-              </a:tr>
-              <a:tr h="0">
-                <a:tc>
-                  <a:txBody>
-                    <a:bodyPr/>
-                    <a:lstStyle/>
-                    <a:p>
-                      <a:pPr lvl="0" indent="0" marL="0">
-                        <a:buNone/>
-                      </a:pPr>
-                      <a:r>
-                        <a:rPr/>
-                        <a:t>Row 4 Cell</a:t>
-                      </a:r>
-                    </a:p>
-                  </a:txBody>
-                </a:tc>
-                <a:tc>
-                  <a:txBody>
-                    <a:bodyPr/>
-                    <a:lstStyle/>
-                    <a:p>
-                      <a:pPr lvl="0" indent="0" marL="0">
-                        <a:buNone/>
-                      </a:pPr>
-                      <a:r>
-                        <a:rPr/>
-                        <a:t>Row 4 Cell</a:t>
-                      </a:r>
-                    </a:p>
-                  </a:txBody>
-                </a:tc>
-                <a:tc>
-                  <a:txBody>
-                    <a:bodyPr/>
-                    <a:lstStyle/>
-                    <a:p>
-                      <a:pPr lvl="0" indent="0" marL="0">
-                        <a:buNone/>
-                      </a:pPr>
-                      <a:r>
-                        <a:rPr/>
-                        <a:t>Row 4 Cell</a:t>
-                      </a:r>
-                    </a:p>
-                  </a:txBody>
-                </a:tc>
-              </a:tr>
-            </a:tbl>
-          </a:graphicData>
-        </a:graphic>
-      </p:graphicFrame>
+              <a:t>Three-column text slide</a:t>
+            </a:r>
+          </a:p>
+          <a:p>
+            <a:pPr lvl="0" indent="0" marL="0">
+              <a:buNone/>
+            </a:pPr>
+            <a:r>
+              <a:rPr b="1"/>
+              <a:t>Column 1</a:t>
+            </a:r>
+          </a:p>
+          <a:p>
+            <a:pPr lvl="0" indent="0" marL="0">
+              <a:buNone/>
+            </a:pPr>
+            <a:r>
+              <a:rPr/>
+              <a:t>Lorem ipsum dolor sit amet, consectetur adipiscing elit.</a:t>
+            </a:r>
+            <a:br/>
+            <a:r>
+              <a:rPr/>
+              <a:t>Vivamus lacinia odio vitae vestibulum vestibulum.</a:t>
+            </a:r>
+          </a:p>
+          <a:p>
+            <a:pPr lvl="0" indent="0" marL="0">
+              <a:buNone/>
+            </a:pPr>
+            <a:r>
+              <a:rPr b="1"/>
+              <a:t>Column 2</a:t>
+            </a:r>
+          </a:p>
+          <a:p>
+            <a:pPr lvl="0" indent="0" marL="0">
+              <a:buNone/>
+            </a:pPr>
+            <a:r>
+              <a:rPr/>
+              <a:t>Sed do eiusmod tempor incididunt ut labore et dolore magna aliqua.</a:t>
+            </a:r>
+            <a:br/>
+            <a:r>
+              <a:rPr/>
+              <a:t>Ut enim ad minim veniam, quis nostrud exercitation ullamco laboris.</a:t>
+            </a:r>
+          </a:p>
+          <a:p>
+            <a:pPr lvl="0" indent="0" marL="0">
+              <a:buNone/>
+            </a:pPr>
+            <a:r>
+              <a:rPr b="1"/>
+              <a:t>Column 3</a:t>
+            </a:r>
+          </a:p>
+          <a:p>
+            <a:pPr lvl="0" indent="0" marL="0">
+              <a:buNone/>
+            </a:pPr>
+            <a:r>
+              <a:rPr/>
+              <a:t>Duis aute irure dolor in reprehenderit in voluptate velit esse cillum dolore eu fugiat nulla pariatur.</a:t>
+            </a:r>
+          </a:p>
+        </p:txBody>
+      </p:sp>
     </p:spTree>
   </p:cSld>
 </p:sld>
@@ -7389,7 +7267,7 @@
             </a:pPr>
             <a:r>
               <a:rPr b="1"/>
-              <a:t>Complex table</a:t>
+              <a:t>Simple table</a:t>
             </a:r>
           </a:p>
         </p:txBody>
@@ -7685,12 +7563,12 @@
       </p:grpSpPr>
       <p:sp>
         <p:nvSpPr>
-          <p:cNvPr id="3" name="Content Placeholder 2"/>
-          <p:cNvSpPr>
-            <a:spLocks noGrp="1"/>
-          </p:cNvSpPr>
-          <p:nvPr>
-            <p:ph idx="1"/>
+          <p:cNvPr id="4" name="Text Placeholder 3"/>
+          <p:cNvSpPr>
+            <a:spLocks noGrp="1"/>
+          </p:cNvSpPr>
+          <p:nvPr>
+            <p:ph idx="2" sz="half" type="body"/>
           </p:nvPr>
         </p:nvSpPr>
         <p:spPr/>
@@ -7706,25 +7584,278 @@
             </a:pPr>
             <a:r>
               <a:rPr b="1"/>
-              <a:t>Task list</a:t>
-            </a:r>
-          </a:p>
-          <a:p>
-            <a:pPr lvl="0"/>
-            <a:r>
-              <a:rPr/>
-              <a:t>☒ Done</a:t>
-            </a:r>
-          </a:p>
-          <a:p>
-            <a:pPr lvl="0"/>
-            <a:r>
-              <a:rPr/>
-              <a:t>☐ To do</a:t>
-            </a:r>
-          </a:p>
-        </p:txBody>
-      </p:sp>
+              <a:t>Complex table</a:t>
+            </a:r>
+          </a:p>
+        </p:txBody>
+      </p:sp>
+      <p:graphicFrame>
+        <p:nvGraphicFramePr>
+          <p:cNvPr id="6" name="Content Placeholder 5"/>
+          <p:cNvGraphicFramePr>
+            <a:graphicFrameLocks noGrp="1"/>
+          </p:cNvGraphicFramePr>
+          <p:nvPr>
+            <p:ph idx="1"/>
+          </p:nvPr>
+        </p:nvGraphicFramePr>
+        <p:xfrm>
+          <a:off x="3568700" y="203200"/>
+          <a:ext cx="5105400" cy="4381500"/>
+        </p:xfrm>
+        <a:graphic>
+          <a:graphicData uri="http://schemas.openxmlformats.org/drawingml/2006/table">
+            <a:tbl>
+              <a:tblPr firstRow="1" bandRow="1">
+                <a:tableStyleId>{5C22544A-7EE6-4342-B048-85BDC9FD1C3A}</a:tableStyleId>
+              </a:tblPr>
+              <a:tblGrid>
+                <a:gridCol w="1701800"/>
+                <a:gridCol w="1701800"/>
+                <a:gridCol w="1701800"/>
+              </a:tblGrid>
+              <a:tr h="0">
+                <a:tc>
+                  <a:txBody>
+                    <a:bodyPr/>
+                    <a:lstStyle/>
+                    <a:p>
+                      <a:pPr lvl="0" indent="0" marL="0">
+                        <a:buNone/>
+                      </a:pPr>
+                      <a:r>
+                        <a:rPr/>
+                        <a:t>Column 1</a:t>
+                      </a:r>
+                    </a:p>
+                  </a:txBody>
+                  <a:tcPr/>
+                </a:tc>
+                <a:tc>
+                  <a:txBody>
+                    <a:bodyPr/>
+                    <a:lstStyle/>
+                    <a:p>
+                      <a:pPr lvl="0" indent="0" marL="0">
+                        <a:buNone/>
+                      </a:pPr>
+                      <a:r>
+                        <a:rPr/>
+                        <a:t>Column 2</a:t>
+                      </a:r>
+                    </a:p>
+                  </a:txBody>
+                  <a:tcPr/>
+                </a:tc>
+                <a:tc>
+                  <a:txBody>
+                    <a:bodyPr/>
+                    <a:lstStyle/>
+                    <a:p>
+                      <a:pPr lvl="0" indent="0" marL="0">
+                        <a:buNone/>
+                      </a:pPr>
+                      <a:r>
+                        <a:rPr/>
+                        <a:t>Column 3</a:t>
+                      </a:r>
+                    </a:p>
+                  </a:txBody>
+                  <a:tcPr/>
+                </a:tc>
+              </a:tr>
+              <a:tr h="0">
+                <a:tc>
+                  <a:txBody>
+                    <a:bodyPr/>
+                    <a:lstStyle/>
+                    <a:p>
+                      <a:pPr lvl="0" indent="0" marL="0">
+                        <a:buNone/>
+                      </a:pPr>
+                      <a:r>
+                        <a:rPr/>
+                        <a:t>Row 1 Cell</a:t>
+                      </a:r>
+                    </a:p>
+                  </a:txBody>
+                </a:tc>
+                <a:tc>
+                  <a:txBody>
+                    <a:bodyPr/>
+                    <a:lstStyle/>
+                    <a:p>
+                      <a:pPr lvl="0" indent="0" marL="0">
+                        <a:buNone/>
+                      </a:pPr>
+                      <a:r>
+                        <a:rPr/>
+                        <a:t>Row 1 Cell</a:t>
+                      </a:r>
+                    </a:p>
+                  </a:txBody>
+                </a:tc>
+                <a:tc>
+                  <a:txBody>
+                    <a:bodyPr/>
+                    <a:lstStyle/>
+                    <a:p>
+                      <a:pPr lvl="0" indent="0" marL="0">
+                        <a:buNone/>
+                      </a:pPr>
+                      <a:r>
+                        <a:rPr/>
+                        <a:t>Row 1 Cell</a:t>
+                      </a:r>
+                    </a:p>
+                  </a:txBody>
+                </a:tc>
+              </a:tr>
+              <a:tr h="0">
+                <a:tc>
+                  <a:txBody>
+                    <a:bodyPr/>
+                    <a:lstStyle/>
+                    <a:p>
+                      <a:pPr lvl="0" indent="0" marL="0">
+                        <a:buNone/>
+                      </a:pPr>
+                      <a:r>
+                        <a:rPr/>
+                        <a:t>Row 2 Cell</a:t>
+                      </a:r>
+                    </a:p>
+                  </a:txBody>
+                </a:tc>
+                <a:tc>
+                  <a:txBody>
+                    <a:bodyPr/>
+                    <a:lstStyle/>
+                    <a:p>
+                      <a:pPr lvl="0" indent="0" marL="0">
+                        <a:buNone/>
+                      </a:pPr>
+                      <a:r>
+                        <a:rPr/>
+                        <a:t>Row 2 Cell</a:t>
+                      </a:r>
+                    </a:p>
+                  </a:txBody>
+                </a:tc>
+                <a:tc>
+                  <a:txBody>
+                    <a:bodyPr/>
+                    <a:lstStyle/>
+                    <a:p>
+                      <a:pPr lvl="0" indent="0" marL="0">
+                        <a:buNone/>
+                      </a:pPr>
+                      <a:r>
+                        <a:rPr/>
+                        <a:t>Row 2 Cell</a:t>
+                      </a:r>
+                    </a:p>
+                  </a:txBody>
+                </a:tc>
+              </a:tr>
+              <a:tr h="0">
+                <a:tc>
+                  <a:txBody>
+                    <a:bodyPr/>
+                    <a:lstStyle/>
+                    <a:p>
+                      <a:pPr lvl="0" indent="0" marL="0">
+                        <a:buNone/>
+                      </a:pPr>
+                      <a:r>
+                        <a:rPr/>
+                        <a:t>Row 3 Cell</a:t>
+                      </a:r>
+                    </a:p>
+                  </a:txBody>
+                </a:tc>
+                <a:tc>
+                  <a:txBody>
+                    <a:bodyPr/>
+                    <a:lstStyle/>
+                    <a:p>
+                      <a:pPr lvl="0" indent="0" marL="0">
+                        <a:buNone/>
+                      </a:pPr>
+                      <a:r>
+                        <a:rPr/>
+                        <a:t>Row 3 Cell</a:t>
+                      </a:r>
+                    </a:p>
+                  </a:txBody>
+                </a:tc>
+                <a:tc>
+                  <a:txBody>
+                    <a:bodyPr/>
+                    <a:lstStyle/>
+                    <a:p>
+                      <a:pPr lvl="0" indent="0" marL="0">
+                        <a:buNone/>
+                      </a:pPr>
+                      <a:r>
+                        <a:rPr/>
+                        <a:t>Row 3 Cell</a:t>
+                      </a:r>
+                    </a:p>
+                  </a:txBody>
+                </a:tc>
+              </a:tr>
+              <a:tr h="0">
+                <a:tc>
+                  <a:txBody>
+                    <a:bodyPr/>
+                    <a:lstStyle/>
+                    <a:p>
+                      <a:pPr lvl="0" indent="0" marL="0">
+                        <a:buNone/>
+                      </a:pPr>
+                      <a:r>
+                        <a:rPr/>
+                        <a:t>Row 4 Cell</a:t>
+                      </a:r>
+                    </a:p>
+                  </a:txBody>
+                </a:tc>
+                <a:tc>
+                  <a:txBody>
+                    <a:bodyPr/>
+                    <a:lstStyle/>
+                    <a:p>
+                      <a:pPr lvl="0" indent="0" marL="0">
+                        <a:buNone/>
+                      </a:pPr>
+                      <a:r>
+                        <a:rPr/>
+                        <a:t>Row 4 Cell</a:t>
+                      </a:r>
+                    </a:p>
+                  </a:txBody>
+                </a:tc>
+                <a:tc>
+                  <a:txBody>
+                    <a:bodyPr/>
+                    <a:lstStyle/>
+                    <a:p>
+                      <a:pPr lvl="0" indent="0" marL="0">
+                        <a:buNone/>
+                      </a:pPr>
+                      <a:r>
+                        <a:rPr/>
+                        <a:t>Row 4 Cell</a:t>
+                      </a:r>
+                    </a:p>
+                  </a:txBody>
+                </a:tc>
+              </a:tr>
+            </a:tbl>
+          </a:graphicData>
+        </a:graphic>
+      </p:graphicFrame>
     </p:spTree>
   </p:cSld>
 </p:sld>
@@ -7770,16 +7901,21 @@
             </a:pPr>
             <a:r>
               <a:rPr b="1"/>
-              <a:t>Embedding videos</a:t>
-            </a:r>
-          </a:p>
-          <a:p>
-            <a:pPr lvl="0" indent="0" marL="0">
-              <a:buNone/>
-            </a:pPr>
-            <a:r>
-              <a:rPr/>
-              <a:t> </a:t>
+              <a:t>Task list</a:t>
+            </a:r>
+          </a:p>
+          <a:p>
+            <a:pPr lvl="0"/>
+            <a:r>
+              <a:rPr/>
+              <a:t>☒ Done</a:t>
+            </a:r>
+          </a:p>
+          <a:p>
+            <a:pPr lvl="0"/>
+            <a:r>
+              <a:rPr/>
+              <a:t>☐ To do</a:t>
             </a:r>
           </a:p>
         </p:txBody>
@@ -7790,6 +7926,65 @@
 </file>
 
 <file path=ppt/slides/slide45.xml><?xml version="1.0" encoding="utf-8"?>
+<p:sld xmlns:a="http://schemas.openxmlformats.org/drawingml/2006/main" xmlns:r="http://schemas.openxmlformats.org/officeDocument/2006/relationships" xmlns:p="http://schemas.openxmlformats.org/presentationml/2006/main">
+  <p:cSld>
+    <p:spTree>
+      <p:nvGrpSpPr>
+        <p:cNvPr id="1" name=""/>
+        <p:cNvGrpSpPr/>
+        <p:nvPr/>
+      </p:nvGrpSpPr>
+      <p:grpSpPr>
+        <a:xfrm>
+          <a:off x="0" y="0"/>
+          <a:ext cx="0" cy="0"/>
+          <a:chOff x="0" y="0"/>
+          <a:chExt cx="0" cy="0"/>
+        </a:xfrm>
+      </p:grpSpPr>
+      <p:sp>
+        <p:nvSpPr>
+          <p:cNvPr id="3" name="Content Placeholder 2"/>
+          <p:cNvSpPr>
+            <a:spLocks noGrp="1"/>
+          </p:cNvSpPr>
+          <p:nvPr>
+            <p:ph idx="1"/>
+          </p:nvPr>
+        </p:nvSpPr>
+        <p:spPr/>
+        <p:txBody>
+          <a:bodyPr/>
+          <a:lstStyle/>
+          <a:p>
+            <a:pPr lvl="0" indent="0" marL="0">
+              <a:spcBef>
+                <a:spcPts val="3000"/>
+              </a:spcBef>
+              <a:buNone/>
+            </a:pPr>
+            <a:r>
+              <a:rPr b="1"/>
+              <a:t>Embedding videos</a:t>
+            </a:r>
+          </a:p>
+          <a:p>
+            <a:pPr lvl="0" indent="0" marL="0">
+              <a:buNone/>
+            </a:pPr>
+            <a:r>
+              <a:rPr/>
+              <a:t> </a:t>
+            </a:r>
+          </a:p>
+        </p:txBody>
+      </p:sp>
+    </p:spTree>
+  </p:cSld>
+</p:sld>
+</file>
+
+<file path=ppt/slides/slide46.xml><?xml version="1.0" encoding="utf-8"?>
 <p:sld xmlns:a="http://schemas.openxmlformats.org/drawingml/2006/main" xmlns:r="http://schemas.openxmlformats.org/officeDocument/2006/relationships" xmlns:p="http://schemas.openxmlformats.org/presentationml/2006/main">
   <p:cSld>
     <p:spTree>
@@ -8055,7 +8250,7 @@
 </p:sld>
 </file>
 
-<file path=ppt/slides/slide46.xml><?xml version="1.0" encoding="utf-8"?>
+<file path=ppt/slides/slide47.xml><?xml version="1.0" encoding="utf-8"?>
 <p:sld xmlns:a="http://schemas.openxmlformats.org/drawingml/2006/main" xmlns:r="http://schemas.openxmlformats.org/officeDocument/2006/relationships" xmlns:p="http://schemas.openxmlformats.org/presentationml/2006/main">
   <p:cSld>
     <p:spTree>
@@ -8213,7 +8408,7 @@
 </p:sld>
 </file>
 
-<file path=ppt/slides/slide47.xml><?xml version="1.0" encoding="utf-8"?>
+<file path=ppt/slides/slide48.xml><?xml version="1.0" encoding="utf-8"?>
 <p:sld xmlns:a="http://schemas.openxmlformats.org/drawingml/2006/main" xmlns:r="http://schemas.openxmlformats.org/officeDocument/2006/relationships" xmlns:p="http://schemas.openxmlformats.org/presentationml/2006/main">
   <p:cSld>
     <p:spTree>

</xml_diff>